<commit_message>
Reduced slide 1 & 2 times.
</commit_message>
<xml_diff>
--- a/Presentations/CS 6440 Technical Presentation Secret Six.pptx
+++ b/Presentations/CS 6440 Technical Presentation Secret Six.pptx
@@ -5000,7 +5000,7 @@
       </p:sp>
       <p:pic>
         <p:nvPicPr>
-          <p:cNvPr id="2" name="Audio 1">
+          <p:cNvPr id="6" name="Audio 5">
             <a:hlinkClick r:id="" action="ppaction://media"/>
           </p:cNvPr>
           <p:cNvPicPr>
@@ -5041,12 +5041,12 @@
   <p:clrMapOvr>
     <a:masterClrMapping/>
   </p:clrMapOvr>
-  <mc:AlternateContent xmlns:mc="http://schemas.openxmlformats.org/markup-compatibility/2006" xmlns:p14="http://schemas.microsoft.com/office/powerpoint/2010/main">
-    <mc:Choice Requires="p14">
-      <p:transition spd="slow" p14:dur="2000" advTm="25080"/>
+  <mc:AlternateContent xmlns:mc="http://schemas.openxmlformats.org/markup-compatibility/2006">
+    <mc:Choice xmlns:p14="http://schemas.microsoft.com/office/powerpoint/2010/main" Requires="p14">
+      <p:transition spd="slow" p14:dur="2000" advTm="16170"/>
     </mc:Choice>
-    <mc:Fallback xmlns="">
-      <p:transition spd="slow" advTm="25080"/>
+    <mc:Fallback>
+      <p:transition spd="slow" advTm="16170"/>
     </mc:Fallback>
   </mc:AlternateContent>
   <p:timing>
@@ -5082,7 +5082,7 @@
                                       <p:cBhvr>
                                         <p:cTn id="6" dur="1" fill="hold"/>
                                         <p:tgtEl>
-                                          <p:spTgt spid="2"/>
+                                          <p:spTgt spid="6"/>
                                         </p:tgtEl>
                                       </p:cBhvr>
                                     </p:cmd>
@@ -5127,7 +5127,7 @@
                   </p:endCondLst>
                 </p:cTn>
                 <p:tgtEl>
-                  <p:spTgt spid="2"/>
+                  <p:spTgt spid="6"/>
                 </p:tgtEl>
               </p:cMediaNode>
             </p:audio>
@@ -5327,11 +5327,11 @@
   <p:clrMapOvr>
     <a:masterClrMapping/>
   </p:clrMapOvr>
-  <mc:AlternateContent xmlns:mc="http://schemas.openxmlformats.org/markup-compatibility/2006">
-    <mc:Choice xmlns:p14="http://schemas.microsoft.com/office/powerpoint/2010/main" Requires="p14">
+  <mc:AlternateContent xmlns:mc="http://schemas.openxmlformats.org/markup-compatibility/2006" xmlns:p14="http://schemas.microsoft.com/office/powerpoint/2010/main">
+    <mc:Choice Requires="p14">
       <p:transition spd="slow" p14:dur="2000" advTm="15050"/>
     </mc:Choice>
-    <mc:Fallback>
+    <mc:Fallback xmlns="">
       <p:transition spd="slow" advTm="15050"/>
     </mc:Fallback>
   </mc:AlternateContent>
@@ -5583,7 +5583,7 @@
       </p:sp>
       <p:pic>
         <p:nvPicPr>
-          <p:cNvPr id="4" name="Audio 3">
+          <p:cNvPr id="2" name="Audio 1">
             <a:hlinkClick r:id="" action="ppaction://media"/>
           </p:cNvPr>
           <p:cNvPicPr>
@@ -5627,12 +5627,12 @@
   <p:clrMapOvr>
     <a:masterClrMapping/>
   </p:clrMapOvr>
-  <mc:AlternateContent xmlns:mc="http://schemas.openxmlformats.org/markup-compatibility/2006" xmlns:p14="http://schemas.microsoft.com/office/powerpoint/2010/main">
-    <mc:Choice Requires="p14">
-      <p:transition spd="slow" p14:dur="2000" advTm="39339"/>
+  <mc:AlternateContent xmlns:mc="http://schemas.openxmlformats.org/markup-compatibility/2006">
+    <mc:Choice xmlns:p14="http://schemas.microsoft.com/office/powerpoint/2010/main" Requires="p14">
+      <p:transition spd="slow" p14:dur="2000" advTm="31498"/>
     </mc:Choice>
-    <mc:Fallback xmlns="">
-      <p:transition spd="slow" advTm="39339"/>
+    <mc:Fallback>
+      <p:transition spd="slow" advTm="31498"/>
     </mc:Fallback>
   </mc:AlternateContent>
   <p:timing>
@@ -5668,7 +5668,7 @@
                                       <p:cBhvr>
                                         <p:cTn id="6" dur="1" fill="hold"/>
                                         <p:tgtEl>
-                                          <p:spTgt spid="4"/>
+                                          <p:spTgt spid="2"/>
                                         </p:tgtEl>
                                       </p:cBhvr>
                                     </p:cmd>
@@ -5713,7 +5713,7 @@
                   </p:endCondLst>
                 </p:cTn>
                 <p:tgtEl>
-                  <p:spTgt spid="4"/>
+                  <p:spTgt spid="2"/>
                 </p:tgtEl>
               </p:cMediaNode>
             </p:audio>

</xml_diff>

<commit_message>
Reduced to fit 5 minutes.
</commit_message>
<xml_diff>
--- a/Presentations/CS 6440 Technical Presentation Secret Six.pptx
+++ b/Presentations/CS 6440 Technical Presentation Secret Six.pptx
@@ -5041,11 +5041,11 @@
   <p:clrMapOvr>
     <a:masterClrMapping/>
   </p:clrMapOvr>
-  <mc:AlternateContent xmlns:mc="http://schemas.openxmlformats.org/markup-compatibility/2006">
-    <mc:Choice xmlns:p14="http://schemas.microsoft.com/office/powerpoint/2010/main" Requires="p14">
+  <mc:AlternateContent xmlns:mc="http://schemas.openxmlformats.org/markup-compatibility/2006" xmlns:p14="http://schemas.microsoft.com/office/powerpoint/2010/main">
+    <mc:Choice Requires="p14">
       <p:transition spd="slow" p14:dur="2000" advTm="16170"/>
     </mc:Choice>
-    <mc:Fallback>
+    <mc:Fallback xmlns="">
       <p:transition spd="slow" advTm="16170"/>
     </mc:Fallback>
   </mc:AlternateContent>
@@ -5286,7 +5286,7 @@
       </p:sp>
       <p:pic>
         <p:nvPicPr>
-          <p:cNvPr id="4" name="Audio 3">
+          <p:cNvPr id="2" name="Audio 1">
             <a:hlinkClick r:id="" action="ppaction://media"/>
           </p:cNvPr>
           <p:cNvPicPr>
@@ -5329,10 +5329,10 @@
   </p:clrMapOvr>
   <mc:AlternateContent xmlns:mc="http://schemas.openxmlformats.org/markup-compatibility/2006" xmlns:p14="http://schemas.microsoft.com/office/powerpoint/2010/main">
     <mc:Choice Requires="p14">
-      <p:transition spd="slow" p14:dur="2000" advTm="15050"/>
+      <p:transition spd="slow" p14:dur="2000" advTm="7633"/>
     </mc:Choice>
     <mc:Fallback xmlns="">
-      <p:transition spd="slow" advTm="15050"/>
+      <p:transition spd="slow" advTm="7633"/>
     </mc:Fallback>
   </mc:AlternateContent>
   <p:timing>
@@ -5368,7 +5368,7 @@
                                       <p:cBhvr>
                                         <p:cTn id="6" dur="1" fill="hold"/>
                                         <p:tgtEl>
-                                          <p:spTgt spid="4"/>
+                                          <p:spTgt spid="2"/>
                                         </p:tgtEl>
                                       </p:cBhvr>
                                     </p:cmd>
@@ -5413,7 +5413,7 @@
                   </p:endCondLst>
                 </p:cTn>
                 <p:tgtEl>
-                  <p:spTgt spid="4"/>
+                  <p:spTgt spid="2"/>
                 </p:tgtEl>
               </p:cMediaNode>
             </p:audio>
@@ -5627,12 +5627,12 @@
   <p:clrMapOvr>
     <a:masterClrMapping/>
   </p:clrMapOvr>
-  <mc:AlternateContent xmlns:mc="http://schemas.openxmlformats.org/markup-compatibility/2006">
-    <mc:Choice xmlns:p14="http://schemas.microsoft.com/office/powerpoint/2010/main" Requires="p14">
-      <p:transition spd="slow" p14:dur="2000" advTm="31498"/>
+  <mc:AlternateContent xmlns:mc="http://schemas.openxmlformats.org/markup-compatibility/2006" xmlns:p14="http://schemas.microsoft.com/office/powerpoint/2010/main">
+    <mc:Choice Requires="p14">
+      <p:transition spd="slow" p14:dur="2000" advTm="12929"/>
     </mc:Choice>
-    <mc:Fallback>
-      <p:transition spd="slow" advTm="31498"/>
+    <mc:Fallback xmlns="">
+      <p:transition spd="slow" advTm="12929"/>
     </mc:Fallback>
   </mc:AlternateContent>
   <p:timing>
@@ -5800,7 +5800,7 @@
       </p:pic>
       <p:pic>
         <p:nvPicPr>
-          <p:cNvPr id="3" name="Audio 2">
+          <p:cNvPr id="2" name="Audio 1">
             <a:hlinkClick r:id="" action="ppaction://media"/>
           </p:cNvPr>
           <p:cNvPicPr>
@@ -5843,10 +5843,224 @@
   </p:clrMapOvr>
   <mc:AlternateContent xmlns:mc="http://schemas.openxmlformats.org/markup-compatibility/2006" xmlns:p14="http://schemas.microsoft.com/office/powerpoint/2010/main">
     <mc:Choice Requires="p14">
-      <p:transition spd="slow" p14:dur="2000" advTm="45818"/>
+      <p:transition spd="slow" p14:dur="2000" advTm="37300"/>
     </mc:Choice>
     <mc:Fallback xmlns="">
-      <p:transition spd="slow" advTm="45818"/>
+      <p:transition spd="slow" advTm="37300"/>
+    </mc:Fallback>
+  </mc:AlternateContent>
+  <p:timing>
+    <p:tnLst>
+      <p:par>
+        <p:cTn id="1" dur="indefinite" restart="never" nodeType="tmRoot">
+          <p:childTnLst>
+            <p:seq concurrent="1" nextAc="seek">
+              <p:cTn id="2" dur="indefinite" nodeType="mainSeq">
+                <p:childTnLst>
+                  <p:par>
+                    <p:cTn id="3" fill="hold">
+                      <p:stCondLst>
+                        <p:cond delay="indefinite"/>
+                        <p:cond evt="onBegin" delay="0">
+                          <p:tn val="2"/>
+                        </p:cond>
+                      </p:stCondLst>
+                      <p:childTnLst>
+                        <p:par>
+                          <p:cTn id="4" fill="hold">
+                            <p:stCondLst>
+                              <p:cond delay="0"/>
+                            </p:stCondLst>
+                            <p:childTnLst>
+                              <p:par>
+                                <p:cTn id="5" presetID="1" presetClass="mediacall" presetSubtype="0" fill="hold" nodeType="afterEffect">
+                                  <p:stCondLst>
+                                    <p:cond delay="0"/>
+                                  </p:stCondLst>
+                                  <p:childTnLst>
+                                    <p:cmd type="call" cmd="playFrom(0.0)">
+                                      <p:cBhvr>
+                                        <p:cTn id="6" dur="1" fill="hold"/>
+                                        <p:tgtEl>
+                                          <p:spTgt spid="2"/>
+                                        </p:tgtEl>
+                                      </p:cBhvr>
+                                    </p:cmd>
+                                  </p:childTnLst>
+                                </p:cTn>
+                              </p:par>
+                            </p:childTnLst>
+                          </p:cTn>
+                        </p:par>
+                      </p:childTnLst>
+                    </p:cTn>
+                  </p:par>
+                </p:childTnLst>
+              </p:cTn>
+              <p:prevCondLst>
+                <p:cond evt="onPrev" delay="0">
+                  <p:tgtEl>
+                    <p:sldTgt/>
+                  </p:tgtEl>
+                </p:cond>
+              </p:prevCondLst>
+              <p:nextCondLst>
+                <p:cond evt="onNext" delay="0">
+                  <p:tgtEl>
+                    <p:sldTgt/>
+                  </p:tgtEl>
+                </p:cond>
+              </p:nextCondLst>
+            </p:seq>
+            <p:audio isNarration="1">
+              <p:cMediaNode vol="80000" showWhenStopped="0">
+                <p:cTn id="7" fill="hold" display="0">
+                  <p:stCondLst>
+                    <p:cond delay="indefinite"/>
+                  </p:stCondLst>
+                  <p:endCondLst>
+                    <p:cond evt="onStopAudio" delay="0">
+                      <p:tgtEl>
+                        <p:sldTgt/>
+                      </p:tgtEl>
+                    </p:cond>
+                  </p:endCondLst>
+                </p:cTn>
+                <p:tgtEl>
+                  <p:spTgt spid="2"/>
+                </p:tgtEl>
+              </p:cMediaNode>
+            </p:audio>
+          </p:childTnLst>
+        </p:cTn>
+      </p:par>
+    </p:tnLst>
+  </p:timing>
+</p:sld>
+</file>
+
+<file path=ppt/slides/slide4.xml><?xml version="1.0" encoding="utf-8"?>
+<p:sld xmlns:a="http://schemas.openxmlformats.org/drawingml/2006/main" xmlns:r="http://schemas.openxmlformats.org/officeDocument/2006/relationships" xmlns:p="http://schemas.openxmlformats.org/presentationml/2006/main">
+  <p:cSld>
+    <p:spTree>
+      <p:nvGrpSpPr>
+        <p:cNvPr id="1" name=""/>
+        <p:cNvGrpSpPr/>
+        <p:nvPr/>
+      </p:nvGrpSpPr>
+      <p:grpSpPr>
+        <a:xfrm>
+          <a:off x="0" y="0"/>
+          <a:ext cx="0" cy="0"/>
+          <a:chOff x="0" y="0"/>
+          <a:chExt cx="0" cy="0"/>
+        </a:xfrm>
+      </p:grpSpPr>
+      <p:sp>
+        <p:nvSpPr>
+          <p:cNvPr id="9" name="Rectangle 8"/>
+          <p:cNvSpPr/>
+          <p:nvPr/>
+        </p:nvSpPr>
+        <p:spPr>
+          <a:xfrm>
+            <a:off x="1758461" y="119363"/>
+            <a:ext cx="6283570" cy="523220"/>
+          </a:xfrm>
+          <a:prstGeom prst="rect">
+            <a:avLst/>
+          </a:prstGeom>
+        </p:spPr>
+        <p:txBody>
+          <a:bodyPr wrap="square">
+            <a:spAutoFit/>
+          </a:bodyPr>
+          <a:lstStyle/>
+          <a:p>
+            <a:r>
+              <a:rPr lang="en-US" sz="2800" dirty="0" smtClean="0">
+                <a:solidFill>
+                  <a:schemeClr val="bg2"/>
+                </a:solidFill>
+              </a:rPr>
+              <a:t>CRC User Flow</a:t>
+            </a:r>
+          </a:p>
+        </p:txBody>
+      </p:sp>
+      <p:pic>
+        <p:nvPicPr>
+          <p:cNvPr id="2" name="Picture 1"/>
+          <p:cNvPicPr>
+            <a:picLocks noChangeAspect="1"/>
+          </p:cNvPicPr>
+          <p:nvPr/>
+        </p:nvPicPr>
+        <p:blipFill>
+          <a:blip r:embed="rId4"/>
+          <a:stretch>
+            <a:fillRect/>
+          </a:stretch>
+        </p:blipFill>
+        <p:spPr>
+          <a:xfrm>
+            <a:off x="2086860" y="905033"/>
+            <a:ext cx="4792912" cy="5575041"/>
+          </a:xfrm>
+          <a:prstGeom prst="rect">
+            <a:avLst/>
+          </a:prstGeom>
+        </p:spPr>
+      </p:pic>
+      <p:pic>
+        <p:nvPicPr>
+          <p:cNvPr id="3" name="Audio 2">
+            <a:hlinkClick r:id="" action="ppaction://media"/>
+          </p:cNvPr>
+          <p:cNvPicPr>
+            <a:picLocks noChangeAspect="1"/>
+          </p:cNvPicPr>
+          <p:nvPr>
+            <a:audioFile r:link="rId2"/>
+            <p:extLst>
+              <p:ext uri="{DAA4B4D4-6D71-4841-9C94-3DE7FCFB9230}">
+                <p14:media xmlns:p14="http://schemas.microsoft.com/office/powerpoint/2010/main" r:embed="rId1"/>
+              </p:ext>
+            </p:extLst>
+          </p:nvPr>
+        </p:nvPicPr>
+        <p:blipFill>
+          <a:blip r:embed="rId5"/>
+          <a:stretch>
+            <a:fillRect/>
+          </a:stretch>
+        </p:blipFill>
+        <p:spPr>
+          <a:xfrm>
+            <a:off x="8382000" y="6096000"/>
+            <a:ext cx="609600" cy="609600"/>
+          </a:xfrm>
+          <a:prstGeom prst="rect">
+            <a:avLst/>
+          </a:prstGeom>
+        </p:spPr>
+      </p:pic>
+    </p:spTree>
+    <p:extLst>
+      <p:ext uri="{BB962C8B-B14F-4D97-AF65-F5344CB8AC3E}">
+        <p14:creationId xmlns:p14="http://schemas.microsoft.com/office/powerpoint/2010/main" val="2144950310"/>
+      </p:ext>
+    </p:extLst>
+  </p:cSld>
+  <p:clrMapOvr>
+    <a:masterClrMapping/>
+  </p:clrMapOvr>
+  <mc:AlternateContent xmlns:mc="http://schemas.openxmlformats.org/markup-compatibility/2006" xmlns:p14="http://schemas.microsoft.com/office/powerpoint/2010/main">
+    <mc:Choice Requires="p14">
+      <p:transition spd="slow" p14:dur="2000" advTm="21284"/>
+    </mc:Choice>
+    <mc:Fallback xmlns="">
+      <p:transition spd="slow" advTm="21284"/>
     </mc:Fallback>
   </mc:AlternateContent>
   <p:timing>
@@ -5928,220 +6142,6 @@
                 </p:cTn>
                 <p:tgtEl>
                   <p:spTgt spid="3"/>
-                </p:tgtEl>
-              </p:cMediaNode>
-            </p:audio>
-          </p:childTnLst>
-        </p:cTn>
-      </p:par>
-    </p:tnLst>
-  </p:timing>
-</p:sld>
-</file>
-
-<file path=ppt/slides/slide4.xml><?xml version="1.0" encoding="utf-8"?>
-<p:sld xmlns:a="http://schemas.openxmlformats.org/drawingml/2006/main" xmlns:r="http://schemas.openxmlformats.org/officeDocument/2006/relationships" xmlns:p="http://schemas.openxmlformats.org/presentationml/2006/main">
-  <p:cSld>
-    <p:spTree>
-      <p:nvGrpSpPr>
-        <p:cNvPr id="1" name=""/>
-        <p:cNvGrpSpPr/>
-        <p:nvPr/>
-      </p:nvGrpSpPr>
-      <p:grpSpPr>
-        <a:xfrm>
-          <a:off x="0" y="0"/>
-          <a:ext cx="0" cy="0"/>
-          <a:chOff x="0" y="0"/>
-          <a:chExt cx="0" cy="0"/>
-        </a:xfrm>
-      </p:grpSpPr>
-      <p:sp>
-        <p:nvSpPr>
-          <p:cNvPr id="9" name="Rectangle 8"/>
-          <p:cNvSpPr/>
-          <p:nvPr/>
-        </p:nvSpPr>
-        <p:spPr>
-          <a:xfrm>
-            <a:off x="1758461" y="119363"/>
-            <a:ext cx="6283570" cy="523220"/>
-          </a:xfrm>
-          <a:prstGeom prst="rect">
-            <a:avLst/>
-          </a:prstGeom>
-        </p:spPr>
-        <p:txBody>
-          <a:bodyPr wrap="square">
-            <a:spAutoFit/>
-          </a:bodyPr>
-          <a:lstStyle/>
-          <a:p>
-            <a:r>
-              <a:rPr lang="en-US" sz="2800" dirty="0" smtClean="0">
-                <a:solidFill>
-                  <a:schemeClr val="bg2"/>
-                </a:solidFill>
-              </a:rPr>
-              <a:t>CRC User Flow</a:t>
-            </a:r>
-          </a:p>
-        </p:txBody>
-      </p:sp>
-      <p:pic>
-        <p:nvPicPr>
-          <p:cNvPr id="2" name="Picture 1"/>
-          <p:cNvPicPr>
-            <a:picLocks noChangeAspect="1"/>
-          </p:cNvPicPr>
-          <p:nvPr/>
-        </p:nvPicPr>
-        <p:blipFill>
-          <a:blip r:embed="rId4"/>
-          <a:stretch>
-            <a:fillRect/>
-          </a:stretch>
-        </p:blipFill>
-        <p:spPr>
-          <a:xfrm>
-            <a:off x="2086860" y="905033"/>
-            <a:ext cx="4792912" cy="5575041"/>
-          </a:xfrm>
-          <a:prstGeom prst="rect">
-            <a:avLst/>
-          </a:prstGeom>
-        </p:spPr>
-      </p:pic>
-      <p:pic>
-        <p:nvPicPr>
-          <p:cNvPr id="4" name="Audio 3">
-            <a:hlinkClick r:id="" action="ppaction://media"/>
-          </p:cNvPr>
-          <p:cNvPicPr>
-            <a:picLocks noChangeAspect="1"/>
-          </p:cNvPicPr>
-          <p:nvPr>
-            <a:audioFile r:link="rId2"/>
-            <p:extLst>
-              <p:ext uri="{DAA4B4D4-6D71-4841-9C94-3DE7FCFB9230}">
-                <p14:media xmlns:p14="http://schemas.microsoft.com/office/powerpoint/2010/main" r:embed="rId1"/>
-              </p:ext>
-            </p:extLst>
-          </p:nvPr>
-        </p:nvPicPr>
-        <p:blipFill>
-          <a:blip r:embed="rId5"/>
-          <a:stretch>
-            <a:fillRect/>
-          </a:stretch>
-        </p:blipFill>
-        <p:spPr>
-          <a:xfrm>
-            <a:off x="8382000" y="6096000"/>
-            <a:ext cx="609600" cy="609600"/>
-          </a:xfrm>
-          <a:prstGeom prst="rect">
-            <a:avLst/>
-          </a:prstGeom>
-        </p:spPr>
-      </p:pic>
-    </p:spTree>
-    <p:extLst>
-      <p:ext uri="{BB962C8B-B14F-4D97-AF65-F5344CB8AC3E}">
-        <p14:creationId xmlns:p14="http://schemas.microsoft.com/office/powerpoint/2010/main" val="2144950310"/>
-      </p:ext>
-    </p:extLst>
-  </p:cSld>
-  <p:clrMapOvr>
-    <a:masterClrMapping/>
-  </p:clrMapOvr>
-  <mc:AlternateContent xmlns:mc="http://schemas.openxmlformats.org/markup-compatibility/2006" xmlns:p14="http://schemas.microsoft.com/office/powerpoint/2010/main">
-    <mc:Choice Requires="p14">
-      <p:transition spd="slow" p14:dur="2000" advTm="31448"/>
-    </mc:Choice>
-    <mc:Fallback xmlns="">
-      <p:transition spd="slow" advTm="31448"/>
-    </mc:Fallback>
-  </mc:AlternateContent>
-  <p:timing>
-    <p:tnLst>
-      <p:par>
-        <p:cTn id="1" dur="indefinite" restart="never" nodeType="tmRoot">
-          <p:childTnLst>
-            <p:seq concurrent="1" nextAc="seek">
-              <p:cTn id="2" dur="indefinite" nodeType="mainSeq">
-                <p:childTnLst>
-                  <p:par>
-                    <p:cTn id="3" fill="hold">
-                      <p:stCondLst>
-                        <p:cond delay="indefinite"/>
-                        <p:cond evt="onBegin" delay="0">
-                          <p:tn val="2"/>
-                        </p:cond>
-                      </p:stCondLst>
-                      <p:childTnLst>
-                        <p:par>
-                          <p:cTn id="4" fill="hold">
-                            <p:stCondLst>
-                              <p:cond delay="0"/>
-                            </p:stCondLst>
-                            <p:childTnLst>
-                              <p:par>
-                                <p:cTn id="5" presetID="1" presetClass="mediacall" presetSubtype="0" fill="hold" nodeType="afterEffect">
-                                  <p:stCondLst>
-                                    <p:cond delay="0"/>
-                                  </p:stCondLst>
-                                  <p:childTnLst>
-                                    <p:cmd type="call" cmd="playFrom(0.0)">
-                                      <p:cBhvr>
-                                        <p:cTn id="6" dur="1" fill="hold"/>
-                                        <p:tgtEl>
-                                          <p:spTgt spid="4"/>
-                                        </p:tgtEl>
-                                      </p:cBhvr>
-                                    </p:cmd>
-                                  </p:childTnLst>
-                                </p:cTn>
-                              </p:par>
-                            </p:childTnLst>
-                          </p:cTn>
-                        </p:par>
-                      </p:childTnLst>
-                    </p:cTn>
-                  </p:par>
-                </p:childTnLst>
-              </p:cTn>
-              <p:prevCondLst>
-                <p:cond evt="onPrev" delay="0">
-                  <p:tgtEl>
-                    <p:sldTgt/>
-                  </p:tgtEl>
-                </p:cond>
-              </p:prevCondLst>
-              <p:nextCondLst>
-                <p:cond evt="onNext" delay="0">
-                  <p:tgtEl>
-                    <p:sldTgt/>
-                  </p:tgtEl>
-                </p:cond>
-              </p:nextCondLst>
-            </p:seq>
-            <p:audio isNarration="1">
-              <p:cMediaNode vol="80000" showWhenStopped="0">
-                <p:cTn id="7" fill="hold" display="0">
-                  <p:stCondLst>
-                    <p:cond delay="indefinite"/>
-                  </p:stCondLst>
-                  <p:endCondLst>
-                    <p:cond evt="onStopAudio" delay="0">
-                      <p:tgtEl>
-                        <p:sldTgt/>
-                      </p:tgtEl>
-                    </p:cond>
-                  </p:endCondLst>
-                </p:cTn>
-                <p:tgtEl>
-                  <p:spTgt spid="4"/>
                 </p:tgtEl>
               </p:cMediaNode>
             </p:audio>
@@ -6967,7 +6967,7 @@
       </p:pic>
       <p:pic>
         <p:nvPicPr>
-          <p:cNvPr id="3" name="Audio 2">
+          <p:cNvPr id="2" name="Audio 1">
             <a:hlinkClick r:id="" action="ppaction://media"/>
           </p:cNvPr>
           <p:cNvPicPr>
@@ -7010,10 +7010,10 @@
   </p:clrMapOvr>
   <mc:AlternateContent xmlns:mc="http://schemas.openxmlformats.org/markup-compatibility/2006" xmlns:p14="http://schemas.microsoft.com/office/powerpoint/2010/main">
     <mc:Choice Requires="p14">
-      <p:transition spd="slow" p14:dur="2000" advTm="97394"/>
+      <p:transition spd="slow" p14:dur="2000" advTm="82607"/>
     </mc:Choice>
     <mc:Fallback xmlns="">
-      <p:transition spd="slow" advTm="97394"/>
+      <p:transition spd="slow" advTm="82607"/>
     </mc:Fallback>
   </mc:AlternateContent>
   <p:timing>
@@ -7049,7 +7049,7 @@
                                       <p:cBhvr>
                                         <p:cTn id="6" dur="1" fill="hold"/>
                                         <p:tgtEl>
-                                          <p:spTgt spid="3"/>
+                                          <p:spTgt spid="2"/>
                                         </p:tgtEl>
                                       </p:cBhvr>
                                     </p:cmd>
@@ -7094,7 +7094,7 @@
                   </p:endCondLst>
                 </p:cTn>
                 <p:tgtEl>
-                  <p:spTgt spid="3"/>
+                  <p:spTgt spid="2"/>
                 </p:tgtEl>
               </p:cMediaNode>
             </p:audio>
@@ -7157,11 +7157,20 @@
       </p:sp>
       <p:pic>
         <p:nvPicPr>
-          <p:cNvPr id="2" name="Picture 1"/>
+          <p:cNvPr id="3" name="Audio 2">
+            <a:hlinkClick r:id="" action="ppaction://media"/>
+          </p:cNvPr>
           <p:cNvPicPr>
             <a:picLocks noChangeAspect="1"/>
           </p:cNvPicPr>
-          <p:nvPr/>
+          <p:nvPr>
+            <a:audioFile r:link="rId2"/>
+            <p:extLst>
+              <p:ext uri="{DAA4B4D4-6D71-4841-9C94-3DE7FCFB9230}">
+                <p14:media xmlns:p14="http://schemas.microsoft.com/office/powerpoint/2010/main" r:embed="rId1"/>
+              </p:ext>
+            </p:extLst>
+          </p:nvPr>
         </p:nvPicPr>
         <p:blipFill>
           <a:blip r:embed="rId4"/>
@@ -7171,8 +7180,8 @@
         </p:blipFill>
         <p:spPr>
           <a:xfrm>
-            <a:off x="2613022" y="853867"/>
-            <a:ext cx="4574447" cy="5839033"/>
+            <a:off x="8382000" y="6096000"/>
+            <a:ext cx="609600" cy="609600"/>
           </a:xfrm>
           <a:prstGeom prst="rect">
             <a:avLst/>
@@ -7181,20 +7190,11 @@
       </p:pic>
       <p:pic>
         <p:nvPicPr>
-          <p:cNvPr id="3" name="Audio 2">
-            <a:hlinkClick r:id="" action="ppaction://media"/>
-          </p:cNvPr>
+          <p:cNvPr id="4" name="Picture 3"/>
           <p:cNvPicPr>
             <a:picLocks noChangeAspect="1"/>
           </p:cNvPicPr>
-          <p:nvPr>
-            <a:audioFile r:link="rId2"/>
-            <p:extLst>
-              <p:ext uri="{DAA4B4D4-6D71-4841-9C94-3DE7FCFB9230}">
-                <p14:media xmlns:p14="http://schemas.microsoft.com/office/powerpoint/2010/main" r:embed="rId1"/>
-              </p:ext>
-            </p:extLst>
-          </p:nvPr>
+          <p:nvPr/>
         </p:nvPicPr>
         <p:blipFill>
           <a:blip r:embed="rId5"/>
@@ -7204,8 +7204,8 @@
         </p:blipFill>
         <p:spPr>
           <a:xfrm>
-            <a:off x="8382000" y="6096000"/>
-            <a:ext cx="609600" cy="609600"/>
+            <a:off x="2171646" y="999268"/>
+            <a:ext cx="4403326" cy="5620607"/>
           </a:xfrm>
           <a:prstGeom prst="rect">
             <a:avLst/>

</xml_diff>